<commit_message>
Problem Statement & Solutions
</commit_message>
<xml_diff>
--- a/PART 1 - ANALYSIS/TechnicalAssessmentAnalysis.pptx
+++ b/PART 1 - ANALYSIS/TechnicalAssessmentAnalysis.pptx
@@ -245,7 +245,7 @@
           <a:p>
             <a:fld id="{3122567D-A753-49C3-B212-A4E05277FA2E}" type="datetimeFigureOut">
               <a:rPr lang="en-US" smtClean="0"/>
-              <a:t>12/16/2023</a:t>
+              <a:t>12/18/2023</a:t>
             </a:fld>
             <a:endParaRPr lang="en-US"/>
           </a:p>
@@ -415,7 +415,7 @@
           <a:p>
             <a:fld id="{3122567D-A753-49C3-B212-A4E05277FA2E}" type="datetimeFigureOut">
               <a:rPr lang="en-US" smtClean="0"/>
-              <a:t>12/16/2023</a:t>
+              <a:t>12/18/2023</a:t>
             </a:fld>
             <a:endParaRPr lang="en-US"/>
           </a:p>
@@ -595,7 +595,7 @@
           <a:p>
             <a:fld id="{3122567D-A753-49C3-B212-A4E05277FA2E}" type="datetimeFigureOut">
               <a:rPr lang="en-US" smtClean="0"/>
-              <a:t>12/16/2023</a:t>
+              <a:t>12/18/2023</a:t>
             </a:fld>
             <a:endParaRPr lang="en-US"/>
           </a:p>
@@ -765,7 +765,7 @@
           <a:p>
             <a:fld id="{3122567D-A753-49C3-B212-A4E05277FA2E}" type="datetimeFigureOut">
               <a:rPr lang="en-US" smtClean="0"/>
-              <a:t>12/16/2023</a:t>
+              <a:t>12/18/2023</a:t>
             </a:fld>
             <a:endParaRPr lang="en-US"/>
           </a:p>
@@ -1009,7 +1009,7 @@
           <a:p>
             <a:fld id="{3122567D-A753-49C3-B212-A4E05277FA2E}" type="datetimeFigureOut">
               <a:rPr lang="en-US" smtClean="0"/>
-              <a:t>12/16/2023</a:t>
+              <a:t>12/18/2023</a:t>
             </a:fld>
             <a:endParaRPr lang="en-US"/>
           </a:p>
@@ -1241,7 +1241,7 @@
           <a:p>
             <a:fld id="{3122567D-A753-49C3-B212-A4E05277FA2E}" type="datetimeFigureOut">
               <a:rPr lang="en-US" smtClean="0"/>
-              <a:t>12/16/2023</a:t>
+              <a:t>12/18/2023</a:t>
             </a:fld>
             <a:endParaRPr lang="en-US"/>
           </a:p>
@@ -1608,7 +1608,7 @@
           <a:p>
             <a:fld id="{3122567D-A753-49C3-B212-A4E05277FA2E}" type="datetimeFigureOut">
               <a:rPr lang="en-US" smtClean="0"/>
-              <a:t>12/16/2023</a:t>
+              <a:t>12/18/2023</a:t>
             </a:fld>
             <a:endParaRPr lang="en-US"/>
           </a:p>
@@ -1726,7 +1726,7 @@
           <a:p>
             <a:fld id="{3122567D-A753-49C3-B212-A4E05277FA2E}" type="datetimeFigureOut">
               <a:rPr lang="en-US" smtClean="0"/>
-              <a:t>12/16/2023</a:t>
+              <a:t>12/18/2023</a:t>
             </a:fld>
             <a:endParaRPr lang="en-US"/>
           </a:p>
@@ -1821,7 +1821,7 @@
           <a:p>
             <a:fld id="{3122567D-A753-49C3-B212-A4E05277FA2E}" type="datetimeFigureOut">
               <a:rPr lang="en-US" smtClean="0"/>
-              <a:t>12/16/2023</a:t>
+              <a:t>12/18/2023</a:t>
             </a:fld>
             <a:endParaRPr lang="en-US"/>
           </a:p>
@@ -2098,7 +2098,7 @@
           <a:p>
             <a:fld id="{3122567D-A753-49C3-B212-A4E05277FA2E}" type="datetimeFigureOut">
               <a:rPr lang="en-US" smtClean="0"/>
-              <a:t>12/16/2023</a:t>
+              <a:t>12/18/2023</a:t>
             </a:fld>
             <a:endParaRPr lang="en-US"/>
           </a:p>
@@ -2355,7 +2355,7 @@
           <a:p>
             <a:fld id="{3122567D-A753-49C3-B212-A4E05277FA2E}" type="datetimeFigureOut">
               <a:rPr lang="en-US" smtClean="0"/>
-              <a:t>12/16/2023</a:t>
+              <a:t>12/18/2023</a:t>
             </a:fld>
             <a:endParaRPr lang="en-US"/>
           </a:p>
@@ -2568,7 +2568,7 @@
           <a:p>
             <a:fld id="{3122567D-A753-49C3-B212-A4E05277FA2E}" type="datetimeFigureOut">
               <a:rPr lang="en-US" smtClean="0"/>
-              <a:t>12/16/2023</a:t>
+              <a:t>12/18/2023</a:t>
             </a:fld>
             <a:endParaRPr lang="en-US"/>
           </a:p>
@@ -4102,7 +4102,7 @@
         <p:spPr>
           <a:xfrm>
             <a:off x="1423612" y="4431268"/>
-            <a:ext cx="10158788" cy="3693319"/>
+            <a:ext cx="10158788" cy="3970318"/>
           </a:xfrm>
           <a:prstGeom prst="rect">
             <a:avLst/>
@@ -4206,7 +4206,10 @@
               <a:buFont typeface="Arial" panose="020B0604020202020204" pitchFamily="34" charset="0"/>
               <a:buChar char="•"/>
             </a:pPr>
-            <a:endParaRPr lang="en-US" dirty="0"/>
+            <a:r>
+              <a:rPr lang="en-US" dirty="0"/>
+              <a:t>Using automated testing tool such as Selenium to test every related services will greatly reduce maintenance time and cost.</a:t>
+            </a:r>
           </a:p>
           <a:p>
             <a:pPr marL="342900" indent="-342900">

</xml_diff>